<commit_message>
Add week 3 slides
</commit_message>
<xml_diff>
--- a/fa16/week 2/Week 2.pptx
+++ b/fa16/week 2/Week 2.pptx
@@ -4207,7 +4207,15 @@
             </a:r>
             <a:r>
               <a:rPr lang="en-US" dirty="0" smtClean="0"/>
-              <a:t> AND F2.toId = F3.fromID</a:t>
+              <a:t> </a:t>
+            </a:r>
+            <a:r>
+              <a:rPr lang="en-US" smtClean="0"/>
+              <a:t>AND F2.toID </a:t>
+            </a:r>
+            <a:r>
+              <a:rPr lang="en-US" dirty="0" smtClean="0"/>
+              <a:t>= F3.fromID</a:t>
             </a:r>
           </a:p>
           <a:p>
@@ -4223,23 +4231,7 @@
             </a:pPr>
             <a:r>
               <a:rPr lang="en-US" dirty="0" smtClean="0"/>
-              <a:t>  AND </a:t>
-            </a:r>
-            <a:r>
-              <a:rPr lang="en-US" dirty="0" smtClean="0"/>
-              <a:t>F3.toID </a:t>
-            </a:r>
-            <a:r>
-              <a:rPr lang="en-US" dirty="0" smtClean="0"/>
-              <a:t>= </a:t>
-            </a:r>
-            <a:r>
-              <a:rPr lang="en-US" dirty="0" smtClean="0"/>
-              <a:t>F4.fromID</a:t>
-            </a:r>
-            <a:r>
-              <a:rPr lang="en-US" dirty="0" smtClean="0"/>
-              <a:t>;</a:t>
+              <a:t>  AND F3.toID = F4.fromID;</a:t>
             </a:r>
           </a:p>
           <a:p>
@@ -4255,23 +4247,7 @@
             </a:pPr>
             <a:r>
               <a:rPr lang="en-US" dirty="0" smtClean="0"/>
-              <a:t>  AND </a:t>
-            </a:r>
-            <a:r>
-              <a:rPr lang="en-US" dirty="0" smtClean="0"/>
-              <a:t>F4.toID </a:t>
-            </a:r>
-            <a:r>
-              <a:rPr lang="en-US" dirty="0" smtClean="0"/>
-              <a:t>= </a:t>
-            </a:r>
-            <a:r>
-              <a:rPr lang="en-US" dirty="0" smtClean="0"/>
-              <a:t>F5.fromID</a:t>
-            </a:r>
-            <a:r>
-              <a:rPr lang="en-US" dirty="0" smtClean="0"/>
-              <a:t>;</a:t>
+              <a:t>  AND F4.toID = F5.fromID;</a:t>
             </a:r>
             <a:endParaRPr lang="en-US" dirty="0"/>
           </a:p>
@@ -4502,19 +4478,11 @@
             </a:r>
             <a:r>
               <a:rPr lang="en-US" sz="2300" dirty="0"/>
-              <a:t> </a:t>
-            </a:r>
-            <a:r>
-              <a:rPr lang="en-US" sz="2300" dirty="0"/>
-              <a:t>c</a:t>
+              <a:t> c</a:t>
             </a:r>
             <a:r>
               <a:rPr lang="en-US" sz="2300" dirty="0" smtClean="0"/>
-              <a:t> </a:t>
-            </a:r>
-            <a:r>
-              <a:rPr lang="en-US" sz="2300" dirty="0" smtClean="0"/>
-              <a:t>AS median</a:t>
+              <a:t> AS median</a:t>
             </a:r>
             <a:endParaRPr lang="en-US" sz="2300" dirty="0"/>
           </a:p>
@@ -5449,19 +5417,7 @@
             </a:r>
             <a:r>
               <a:rPr lang="en-US" dirty="0" smtClean="0"/>
-              <a:t>Songs S, </a:t>
-            </a:r>
-            <a:r>
-              <a:rPr lang="en-US" dirty="0" smtClean="0"/>
-              <a:t>Albums Al, </a:t>
-            </a:r>
-            <a:r>
-              <a:rPr lang="en-US" dirty="0" smtClean="0"/>
-              <a:t>Artists </a:t>
-            </a:r>
-            <a:r>
-              <a:rPr lang="en-US" dirty="0" smtClean="0"/>
-              <a:t>A</a:t>
+              <a:t>Songs S, Albums Al, Artists A</a:t>
             </a:r>
             <a:endParaRPr lang="en-US" dirty="0"/>
           </a:p>
@@ -5501,11 +5457,7 @@
             </a:r>
             <a:r>
               <a:rPr lang="en-US" smtClean="0"/>
-              <a:t>= </a:t>
-            </a:r>
-            <a:r>
-              <a:rPr lang="en-US" smtClean="0"/>
-              <a:t>A.artist_id</a:t>
+              <a:t>= A.artist_id</a:t>
             </a:r>
             <a:endParaRPr lang="en-US" dirty="0" smtClean="0"/>
           </a:p>
@@ -6081,7 +6033,7 @@
             </a:r>
             <a:r>
               <a:rPr lang="en-US" sz="2300" dirty="0" err="1" smtClean="0"/>
-              <a:t>Ar.Artist_name</a:t>
+              <a:t>Ar.artist_name</a:t>
             </a:r>
             <a:endParaRPr lang="en-US" sz="2300" dirty="0"/>
           </a:p>

</xml_diff>